<commit_message>
edited ppt and added member names
</commit_message>
<xml_diff>
--- a/StudentWork/Mohammed/MohammedSITEReport .pptx
+++ b/StudentWork/Mohammed/MohammedSITEReport .pptx
@@ -162,7 +162,6 @@
     </c:plotArea>
     <c:legend>
       <c:legendPos val="b"/>
-      <c:layout/>
       <c:overlay val="0"/>
       <c:spPr>
         <a:solidFill>
@@ -264,7 +263,6 @@
     </c:plotArea>
     <c:legend>
       <c:legendPos val="b"/>
-      <c:layout/>
       <c:overlay val="0"/>
       <c:spPr>
         <a:solidFill>
@@ -620,9 +618,7 @@
               </c:spPr>
             </c:leaderLines>
             <c:extLst>
-              <c:ext xmlns:c15="http://schemas.microsoft.com/office/drawing/2012/chart" uri="{CE6537A1-D6FC-4f65-9D91-7224C49458BB}">
-                <c15:layout/>
-              </c:ext>
+              <c:ext xmlns:c15="http://schemas.microsoft.com/office/drawing/2012/chart" uri="{CE6537A1-D6FC-4f65-9D91-7224C49458BB}"/>
             </c:extLst>
           </c:dLbls>
           <c:cat>
@@ -694,7 +690,6 @@
     </c:plotArea>
     <c:legend>
       <c:legendPos val="b"/>
-      <c:layout/>
       <c:overlay val="0"/>
       <c:spPr>
         <a:noFill/>
@@ -954,9 +949,7 @@
               </c:spPr>
             </c:leaderLines>
             <c:extLst>
-              <c:ext xmlns:c15="http://schemas.microsoft.com/office/drawing/2012/chart" uri="{CE6537A1-D6FC-4f65-9D91-7224C49458BB}">
-                <c15:layout/>
-              </c:ext>
+              <c:ext xmlns:c15="http://schemas.microsoft.com/office/drawing/2012/chart" uri="{CE6537A1-D6FC-4f65-9D91-7224C49458BB}"/>
             </c:extLst>
           </c:dLbls>
           <c:cat>
@@ -1028,7 +1021,6 @@
     </c:plotArea>
     <c:legend>
       <c:legendPos val="b"/>
-      <c:layout/>
       <c:overlay val="0"/>
       <c:spPr>
         <a:noFill/>
@@ -4008,7 +4000,7 @@
           <a:p>
             <a:fld id="{6963C194-1526-460D-B92F-C12D4B2DFC6D}" type="datetimeFigureOut">
               <a:rPr lang="en-US" smtClean="0"/>
-              <a:t>2/23/2020</a:t>
+              <a:t>3/4/20</a:t>
             </a:fld>
             <a:endParaRPr lang="en-US"/>
           </a:p>
@@ -4072,38 +4064,37 @@
           <a:p>
             <a:pPr lvl="0"/>
             <a:r>
-              <a:rPr lang="en-US" smtClean="0"/>
+              <a:rPr lang="en-US"/>
               <a:t>Edit Master text styles</a:t>
             </a:r>
           </a:p>
           <a:p>
             <a:pPr lvl="1"/>
             <a:r>
-              <a:rPr lang="en-US" smtClean="0"/>
+              <a:rPr lang="en-US"/>
               <a:t>Second level</a:t>
             </a:r>
           </a:p>
           <a:p>
             <a:pPr lvl="2"/>
             <a:r>
-              <a:rPr lang="en-US" smtClean="0"/>
+              <a:rPr lang="en-US"/>
               <a:t>Third level</a:t>
             </a:r>
           </a:p>
           <a:p>
             <a:pPr lvl="3"/>
             <a:r>
-              <a:rPr lang="en-US" smtClean="0"/>
+              <a:rPr lang="en-US"/>
               <a:t>Fourth level</a:t>
             </a:r>
           </a:p>
           <a:p>
             <a:pPr lvl="4"/>
             <a:r>
-              <a:rPr lang="en-US" smtClean="0"/>
+              <a:rPr lang="en-US"/>
               <a:t>Fifth level</a:t>
             </a:r>
-            <a:endParaRPr lang="en-US"/>
           </a:p>
         </p:txBody>
       </p:sp>
@@ -4906,10 +4897,9 @@
           </a:lstStyle>
           <a:p>
             <a:r>
-              <a:rPr lang="en-US" smtClean="0"/>
+              <a:rPr lang="en-US"/>
               <a:t>Click to edit Master title style</a:t>
             </a:r>
-            <a:endParaRPr lang="en-US"/>
           </a:p>
         </p:txBody>
       </p:sp>
@@ -4971,10 +4961,9 @@
           </a:lstStyle>
           <a:p>
             <a:r>
-              <a:rPr lang="en-US" smtClean="0"/>
+              <a:rPr lang="en-US"/>
               <a:t>Click to edit Master subtitle style</a:t>
             </a:r>
-            <a:endParaRPr lang="en-US"/>
           </a:p>
         </p:txBody>
       </p:sp>
@@ -4995,7 +4984,7 @@
           <a:p>
             <a:fld id="{E4C50F65-6A6A-4013-82DA-696B9E833C7A}" type="datetimeFigureOut">
               <a:rPr lang="en-US" smtClean="0"/>
-              <a:t>2/23/2020</a:t>
+              <a:t>3/4/20</a:t>
             </a:fld>
             <a:endParaRPr lang="en-US"/>
           </a:p>
@@ -5089,10 +5078,9 @@
           <a:lstStyle/>
           <a:p>
             <a:r>
-              <a:rPr lang="en-US" smtClean="0"/>
+              <a:rPr lang="en-US"/>
               <a:t>Click to edit Master title style</a:t>
             </a:r>
-            <a:endParaRPr lang="en-US"/>
           </a:p>
         </p:txBody>
       </p:sp>
@@ -5113,38 +5101,37 @@
           <a:p>
             <a:pPr lvl="0"/>
             <a:r>
-              <a:rPr lang="en-US" smtClean="0"/>
+              <a:rPr lang="en-US"/>
               <a:t>Edit Master text styles</a:t>
             </a:r>
           </a:p>
           <a:p>
             <a:pPr lvl="1"/>
             <a:r>
-              <a:rPr lang="en-US" smtClean="0"/>
+              <a:rPr lang="en-US"/>
               <a:t>Second level</a:t>
             </a:r>
           </a:p>
           <a:p>
             <a:pPr lvl="2"/>
             <a:r>
-              <a:rPr lang="en-US" smtClean="0"/>
+              <a:rPr lang="en-US"/>
               <a:t>Third level</a:t>
             </a:r>
           </a:p>
           <a:p>
             <a:pPr lvl="3"/>
             <a:r>
-              <a:rPr lang="en-US" smtClean="0"/>
+              <a:rPr lang="en-US"/>
               <a:t>Fourth level</a:t>
             </a:r>
           </a:p>
           <a:p>
             <a:pPr lvl="4"/>
             <a:r>
-              <a:rPr lang="en-US" smtClean="0"/>
+              <a:rPr lang="en-US"/>
               <a:t>Fifth level</a:t>
             </a:r>
-            <a:endParaRPr lang="en-US"/>
           </a:p>
         </p:txBody>
       </p:sp>
@@ -5165,7 +5152,7 @@
           <a:p>
             <a:fld id="{E4C50F65-6A6A-4013-82DA-696B9E833C7A}" type="datetimeFigureOut">
               <a:rPr lang="en-US" smtClean="0"/>
-              <a:t>2/23/2020</a:t>
+              <a:t>3/4/20</a:t>
             </a:fld>
             <a:endParaRPr lang="en-US"/>
           </a:p>
@@ -5264,10 +5251,9 @@
           <a:lstStyle/>
           <a:p>
             <a:r>
-              <a:rPr lang="en-US" smtClean="0"/>
+              <a:rPr lang="en-US"/>
               <a:t>Click to edit Master title style</a:t>
             </a:r>
-            <a:endParaRPr lang="en-US"/>
           </a:p>
         </p:txBody>
       </p:sp>
@@ -5293,38 +5279,37 @@
           <a:p>
             <a:pPr lvl="0"/>
             <a:r>
-              <a:rPr lang="en-US" smtClean="0"/>
+              <a:rPr lang="en-US"/>
               <a:t>Edit Master text styles</a:t>
             </a:r>
           </a:p>
           <a:p>
             <a:pPr lvl="1"/>
             <a:r>
-              <a:rPr lang="en-US" smtClean="0"/>
+              <a:rPr lang="en-US"/>
               <a:t>Second level</a:t>
             </a:r>
           </a:p>
           <a:p>
             <a:pPr lvl="2"/>
             <a:r>
-              <a:rPr lang="en-US" smtClean="0"/>
+              <a:rPr lang="en-US"/>
               <a:t>Third level</a:t>
             </a:r>
           </a:p>
           <a:p>
             <a:pPr lvl="3"/>
             <a:r>
-              <a:rPr lang="en-US" smtClean="0"/>
+              <a:rPr lang="en-US"/>
               <a:t>Fourth level</a:t>
             </a:r>
           </a:p>
           <a:p>
             <a:pPr lvl="4"/>
             <a:r>
-              <a:rPr lang="en-US" smtClean="0"/>
+              <a:rPr lang="en-US"/>
               <a:t>Fifth level</a:t>
             </a:r>
-            <a:endParaRPr lang="en-US"/>
           </a:p>
         </p:txBody>
       </p:sp>
@@ -5345,7 +5330,7 @@
           <a:p>
             <a:fld id="{E4C50F65-6A6A-4013-82DA-696B9E833C7A}" type="datetimeFigureOut">
               <a:rPr lang="en-US" smtClean="0"/>
-              <a:t>2/23/2020</a:t>
+              <a:t>3/4/20</a:t>
             </a:fld>
             <a:endParaRPr lang="en-US"/>
           </a:p>
@@ -5804,14 +5789,7 @@
   <p:clrMapOvr>
     <a:masterClrMapping/>
   </p:clrMapOvr>
-  <p:timing>
-    <p:tnLst>
-      <p:par>
-        <p:cTn id="1" dur="indefinite" restart="never" nodeType="tmRoot"/>
-      </p:par>
-    </p:tnLst>
-  </p:timing>
-  <p:extLst mod="1">
+  <p:extLst>
     <p:ext uri="{DCECCB84-F9BA-43D5-87BE-67443E8EF086}">
       <p15:sldGuideLst xmlns:p15="http://schemas.microsoft.com/office/powerpoint/2012/main">
         <p15:guide id="1" orient="horz" pos="2160">
@@ -5863,10 +5841,9 @@
           <a:lstStyle/>
           <a:p>
             <a:r>
-              <a:rPr lang="en-US" smtClean="0"/>
+              <a:rPr lang="en-US"/>
               <a:t>Click to edit Master title style</a:t>
             </a:r>
-            <a:endParaRPr lang="en-US"/>
           </a:p>
         </p:txBody>
       </p:sp>
@@ -5887,38 +5864,37 @@
           <a:p>
             <a:pPr lvl="0"/>
             <a:r>
-              <a:rPr lang="en-US" smtClean="0"/>
+              <a:rPr lang="en-US"/>
               <a:t>Edit Master text styles</a:t>
             </a:r>
           </a:p>
           <a:p>
             <a:pPr lvl="1"/>
             <a:r>
-              <a:rPr lang="en-US" smtClean="0"/>
+              <a:rPr lang="en-US"/>
               <a:t>Second level</a:t>
             </a:r>
           </a:p>
           <a:p>
             <a:pPr lvl="2"/>
             <a:r>
-              <a:rPr lang="en-US" smtClean="0"/>
+              <a:rPr lang="en-US"/>
               <a:t>Third level</a:t>
             </a:r>
           </a:p>
           <a:p>
             <a:pPr lvl="3"/>
             <a:r>
-              <a:rPr lang="en-US" smtClean="0"/>
+              <a:rPr lang="en-US"/>
               <a:t>Fourth level</a:t>
             </a:r>
           </a:p>
           <a:p>
             <a:pPr lvl="4"/>
             <a:r>
-              <a:rPr lang="en-US" smtClean="0"/>
+              <a:rPr lang="en-US"/>
               <a:t>Fifth level</a:t>
             </a:r>
-            <a:endParaRPr lang="en-US"/>
           </a:p>
         </p:txBody>
       </p:sp>
@@ -5939,7 +5915,7 @@
           <a:p>
             <a:fld id="{E4C50F65-6A6A-4013-82DA-696B9E833C7A}" type="datetimeFigureOut">
               <a:rPr lang="en-US" smtClean="0"/>
-              <a:t>2/23/2020</a:t>
+              <a:t>3/4/20</a:t>
             </a:fld>
             <a:endParaRPr lang="en-US"/>
           </a:p>
@@ -6042,10 +6018,9 @@
           </a:lstStyle>
           <a:p>
             <a:r>
-              <a:rPr lang="en-US" smtClean="0"/>
+              <a:rPr lang="en-US"/>
               <a:t>Click to edit Master title style</a:t>
             </a:r>
-            <a:endParaRPr lang="en-US"/>
           </a:p>
         </p:txBody>
       </p:sp>
@@ -6162,7 +6137,7 @@
           <a:p>
             <a:pPr lvl="0"/>
             <a:r>
-              <a:rPr lang="en-US" smtClean="0"/>
+              <a:rPr lang="en-US"/>
               <a:t>Edit Master text styles</a:t>
             </a:r>
           </a:p>
@@ -6185,7 +6160,7 @@
           <a:p>
             <a:fld id="{E4C50F65-6A6A-4013-82DA-696B9E833C7A}" type="datetimeFigureOut">
               <a:rPr lang="en-US" smtClean="0"/>
-              <a:t>2/23/2020</a:t>
+              <a:t>3/4/20</a:t>
             </a:fld>
             <a:endParaRPr lang="en-US"/>
           </a:p>
@@ -6279,10 +6254,9 @@
           <a:lstStyle/>
           <a:p>
             <a:r>
-              <a:rPr lang="en-US" smtClean="0"/>
+              <a:rPr lang="en-US"/>
               <a:t>Click to edit Master title style</a:t>
             </a:r>
-            <a:endParaRPr lang="en-US"/>
           </a:p>
         </p:txBody>
       </p:sp>
@@ -6308,38 +6282,37 @@
           <a:p>
             <a:pPr lvl="0"/>
             <a:r>
-              <a:rPr lang="en-US" smtClean="0"/>
+              <a:rPr lang="en-US"/>
               <a:t>Edit Master text styles</a:t>
             </a:r>
           </a:p>
           <a:p>
             <a:pPr lvl="1"/>
             <a:r>
-              <a:rPr lang="en-US" smtClean="0"/>
+              <a:rPr lang="en-US"/>
               <a:t>Second level</a:t>
             </a:r>
           </a:p>
           <a:p>
             <a:pPr lvl="2"/>
             <a:r>
-              <a:rPr lang="en-US" smtClean="0"/>
+              <a:rPr lang="en-US"/>
               <a:t>Third level</a:t>
             </a:r>
           </a:p>
           <a:p>
             <a:pPr lvl="3"/>
             <a:r>
-              <a:rPr lang="en-US" smtClean="0"/>
+              <a:rPr lang="en-US"/>
               <a:t>Fourth level</a:t>
             </a:r>
           </a:p>
           <a:p>
             <a:pPr lvl="4"/>
             <a:r>
-              <a:rPr lang="en-US" smtClean="0"/>
+              <a:rPr lang="en-US"/>
               <a:t>Fifth level</a:t>
             </a:r>
-            <a:endParaRPr lang="en-US"/>
           </a:p>
         </p:txBody>
       </p:sp>
@@ -6365,38 +6338,37 @@
           <a:p>
             <a:pPr lvl="0"/>
             <a:r>
-              <a:rPr lang="en-US" smtClean="0"/>
+              <a:rPr lang="en-US"/>
               <a:t>Edit Master text styles</a:t>
             </a:r>
           </a:p>
           <a:p>
             <a:pPr lvl="1"/>
             <a:r>
-              <a:rPr lang="en-US" smtClean="0"/>
+              <a:rPr lang="en-US"/>
               <a:t>Second level</a:t>
             </a:r>
           </a:p>
           <a:p>
             <a:pPr lvl="2"/>
             <a:r>
-              <a:rPr lang="en-US" smtClean="0"/>
+              <a:rPr lang="en-US"/>
               <a:t>Third level</a:t>
             </a:r>
           </a:p>
           <a:p>
             <a:pPr lvl="3"/>
             <a:r>
-              <a:rPr lang="en-US" smtClean="0"/>
+              <a:rPr lang="en-US"/>
               <a:t>Fourth level</a:t>
             </a:r>
           </a:p>
           <a:p>
             <a:pPr lvl="4"/>
             <a:r>
-              <a:rPr lang="en-US" smtClean="0"/>
+              <a:rPr lang="en-US"/>
               <a:t>Fifth level</a:t>
             </a:r>
-            <a:endParaRPr lang="en-US"/>
           </a:p>
         </p:txBody>
       </p:sp>
@@ -6417,7 +6389,7 @@
           <a:p>
             <a:fld id="{E4C50F65-6A6A-4013-82DA-696B9E833C7A}" type="datetimeFigureOut">
               <a:rPr lang="en-US" smtClean="0"/>
-              <a:t>2/23/2020</a:t>
+              <a:t>3/4/20</a:t>
             </a:fld>
             <a:endParaRPr lang="en-US"/>
           </a:p>
@@ -6516,10 +6488,9 @@
           <a:lstStyle/>
           <a:p>
             <a:r>
-              <a:rPr lang="en-US" smtClean="0"/>
+              <a:rPr lang="en-US"/>
               <a:t>Click to edit Master title style</a:t>
             </a:r>
-            <a:endParaRPr lang="en-US"/>
           </a:p>
         </p:txBody>
       </p:sp>
@@ -6582,7 +6553,7 @@
           <a:p>
             <a:pPr lvl="0"/>
             <a:r>
-              <a:rPr lang="en-US" smtClean="0"/>
+              <a:rPr lang="en-US"/>
               <a:t>Edit Master text styles</a:t>
             </a:r>
           </a:p>
@@ -6610,38 +6581,37 @@
           <a:p>
             <a:pPr lvl="0"/>
             <a:r>
-              <a:rPr lang="en-US" smtClean="0"/>
+              <a:rPr lang="en-US"/>
               <a:t>Edit Master text styles</a:t>
             </a:r>
           </a:p>
           <a:p>
             <a:pPr lvl="1"/>
             <a:r>
-              <a:rPr lang="en-US" smtClean="0"/>
+              <a:rPr lang="en-US"/>
               <a:t>Second level</a:t>
             </a:r>
           </a:p>
           <a:p>
             <a:pPr lvl="2"/>
             <a:r>
-              <a:rPr lang="en-US" smtClean="0"/>
+              <a:rPr lang="en-US"/>
               <a:t>Third level</a:t>
             </a:r>
           </a:p>
           <a:p>
             <a:pPr lvl="3"/>
             <a:r>
-              <a:rPr lang="en-US" smtClean="0"/>
+              <a:rPr lang="en-US"/>
               <a:t>Fourth level</a:t>
             </a:r>
           </a:p>
           <a:p>
             <a:pPr lvl="4"/>
             <a:r>
-              <a:rPr lang="en-US" smtClean="0"/>
+              <a:rPr lang="en-US"/>
               <a:t>Fifth level</a:t>
             </a:r>
-            <a:endParaRPr lang="en-US"/>
           </a:p>
         </p:txBody>
       </p:sp>
@@ -6704,7 +6674,7 @@
           <a:p>
             <a:pPr lvl="0"/>
             <a:r>
-              <a:rPr lang="en-US" smtClean="0"/>
+              <a:rPr lang="en-US"/>
               <a:t>Edit Master text styles</a:t>
             </a:r>
           </a:p>
@@ -6732,38 +6702,37 @@
           <a:p>
             <a:pPr lvl="0"/>
             <a:r>
-              <a:rPr lang="en-US" smtClean="0"/>
+              <a:rPr lang="en-US"/>
               <a:t>Edit Master text styles</a:t>
             </a:r>
           </a:p>
           <a:p>
             <a:pPr lvl="1"/>
             <a:r>
-              <a:rPr lang="en-US" smtClean="0"/>
+              <a:rPr lang="en-US"/>
               <a:t>Second level</a:t>
             </a:r>
           </a:p>
           <a:p>
             <a:pPr lvl="2"/>
             <a:r>
-              <a:rPr lang="en-US" smtClean="0"/>
+              <a:rPr lang="en-US"/>
               <a:t>Third level</a:t>
             </a:r>
           </a:p>
           <a:p>
             <a:pPr lvl="3"/>
             <a:r>
-              <a:rPr lang="en-US" smtClean="0"/>
+              <a:rPr lang="en-US"/>
               <a:t>Fourth level</a:t>
             </a:r>
           </a:p>
           <a:p>
             <a:pPr lvl="4"/>
             <a:r>
-              <a:rPr lang="en-US" smtClean="0"/>
+              <a:rPr lang="en-US"/>
               <a:t>Fifth level</a:t>
             </a:r>
-            <a:endParaRPr lang="en-US"/>
           </a:p>
         </p:txBody>
       </p:sp>
@@ -6784,7 +6753,7 @@
           <a:p>
             <a:fld id="{E4C50F65-6A6A-4013-82DA-696B9E833C7A}" type="datetimeFigureOut">
               <a:rPr lang="en-US" smtClean="0"/>
-              <a:t>2/23/2020</a:t>
+              <a:t>3/4/20</a:t>
             </a:fld>
             <a:endParaRPr lang="en-US"/>
           </a:p>
@@ -6878,10 +6847,9 @@
           <a:lstStyle/>
           <a:p>
             <a:r>
-              <a:rPr lang="en-US" smtClean="0"/>
+              <a:rPr lang="en-US"/>
               <a:t>Click to edit Master title style</a:t>
             </a:r>
-            <a:endParaRPr lang="en-US"/>
           </a:p>
         </p:txBody>
       </p:sp>
@@ -6902,7 +6870,7 @@
           <a:p>
             <a:fld id="{E4C50F65-6A6A-4013-82DA-696B9E833C7A}" type="datetimeFigureOut">
               <a:rPr lang="en-US" smtClean="0"/>
-              <a:t>2/23/2020</a:t>
+              <a:t>3/4/20</a:t>
             </a:fld>
             <a:endParaRPr lang="en-US"/>
           </a:p>
@@ -6997,7 +6965,7 @@
           <a:p>
             <a:fld id="{E4C50F65-6A6A-4013-82DA-696B9E833C7A}" type="datetimeFigureOut">
               <a:rPr lang="en-US" smtClean="0"/>
-              <a:t>2/23/2020</a:t>
+              <a:t>3/4/20</a:t>
             </a:fld>
             <a:endParaRPr lang="en-US"/>
           </a:p>
@@ -7100,10 +7068,9 @@
           </a:lstStyle>
           <a:p>
             <a:r>
-              <a:rPr lang="en-US" smtClean="0"/>
+              <a:rPr lang="en-US"/>
               <a:t>Click to edit Master title style</a:t>
             </a:r>
-            <a:endParaRPr lang="en-US"/>
           </a:p>
         </p:txBody>
       </p:sp>
@@ -7157,38 +7124,37 @@
           <a:p>
             <a:pPr lvl="0"/>
             <a:r>
-              <a:rPr lang="en-US" smtClean="0"/>
+              <a:rPr lang="en-US"/>
               <a:t>Edit Master text styles</a:t>
             </a:r>
           </a:p>
           <a:p>
             <a:pPr lvl="1"/>
             <a:r>
-              <a:rPr lang="en-US" smtClean="0"/>
+              <a:rPr lang="en-US"/>
               <a:t>Second level</a:t>
             </a:r>
           </a:p>
           <a:p>
             <a:pPr lvl="2"/>
             <a:r>
-              <a:rPr lang="en-US" smtClean="0"/>
+              <a:rPr lang="en-US"/>
               <a:t>Third level</a:t>
             </a:r>
           </a:p>
           <a:p>
             <a:pPr lvl="3"/>
             <a:r>
-              <a:rPr lang="en-US" smtClean="0"/>
+              <a:rPr lang="en-US"/>
               <a:t>Fourth level</a:t>
             </a:r>
           </a:p>
           <a:p>
             <a:pPr lvl="4"/>
             <a:r>
-              <a:rPr lang="en-US" smtClean="0"/>
+              <a:rPr lang="en-US"/>
               <a:t>Fifth level</a:t>
             </a:r>
-            <a:endParaRPr lang="en-US"/>
           </a:p>
         </p:txBody>
       </p:sp>
@@ -7251,7 +7217,7 @@
           <a:p>
             <a:pPr lvl="0"/>
             <a:r>
-              <a:rPr lang="en-US" smtClean="0"/>
+              <a:rPr lang="en-US"/>
               <a:t>Edit Master text styles</a:t>
             </a:r>
           </a:p>
@@ -7274,7 +7240,7 @@
           <a:p>
             <a:fld id="{E4C50F65-6A6A-4013-82DA-696B9E833C7A}" type="datetimeFigureOut">
               <a:rPr lang="en-US" smtClean="0"/>
-              <a:t>2/23/2020</a:t>
+              <a:t>3/4/20</a:t>
             </a:fld>
             <a:endParaRPr lang="en-US"/>
           </a:p>
@@ -7377,10 +7343,9 @@
           </a:lstStyle>
           <a:p>
             <a:r>
-              <a:rPr lang="en-US" smtClean="0"/>
+              <a:rPr lang="en-US"/>
               <a:t>Click to edit Master title style</a:t>
             </a:r>
-            <a:endParaRPr lang="en-US"/>
           </a:p>
         </p:txBody>
       </p:sp>
@@ -7504,7 +7469,7 @@
           <a:p>
             <a:pPr lvl="0"/>
             <a:r>
-              <a:rPr lang="en-US" smtClean="0"/>
+              <a:rPr lang="en-US"/>
               <a:t>Edit Master text styles</a:t>
             </a:r>
           </a:p>
@@ -7527,7 +7492,7 @@
           <a:p>
             <a:fld id="{E4C50F65-6A6A-4013-82DA-696B9E833C7A}" type="datetimeFigureOut">
               <a:rPr lang="en-US" smtClean="0"/>
-              <a:t>2/23/2020</a:t>
+              <a:t>3/4/20</a:t>
             </a:fld>
             <a:endParaRPr lang="en-US"/>
           </a:p>
@@ -7636,10 +7601,9 @@
           <a:lstStyle/>
           <a:p>
             <a:r>
-              <a:rPr lang="en-US" smtClean="0"/>
+              <a:rPr lang="en-US"/>
               <a:t>Click to edit Master title style</a:t>
             </a:r>
-            <a:endParaRPr lang="en-US"/>
           </a:p>
         </p:txBody>
       </p:sp>
@@ -7670,38 +7634,37 @@
           <a:p>
             <a:pPr lvl="0"/>
             <a:r>
-              <a:rPr lang="en-US" smtClean="0"/>
+              <a:rPr lang="en-US"/>
               <a:t>Edit Master text styles</a:t>
             </a:r>
           </a:p>
           <a:p>
             <a:pPr lvl="1"/>
             <a:r>
-              <a:rPr lang="en-US" smtClean="0"/>
+              <a:rPr lang="en-US"/>
               <a:t>Second level</a:t>
             </a:r>
           </a:p>
           <a:p>
             <a:pPr lvl="2"/>
             <a:r>
-              <a:rPr lang="en-US" smtClean="0"/>
+              <a:rPr lang="en-US"/>
               <a:t>Third level</a:t>
             </a:r>
           </a:p>
           <a:p>
             <a:pPr lvl="3"/>
             <a:r>
-              <a:rPr lang="en-US" smtClean="0"/>
+              <a:rPr lang="en-US"/>
               <a:t>Fourth level</a:t>
             </a:r>
           </a:p>
           <a:p>
             <a:pPr lvl="4"/>
             <a:r>
-              <a:rPr lang="en-US" smtClean="0"/>
+              <a:rPr lang="en-US"/>
               <a:t>Fifth level</a:t>
             </a:r>
-            <a:endParaRPr lang="en-US"/>
           </a:p>
         </p:txBody>
       </p:sp>
@@ -7740,7 +7703,7 @@
           <a:p>
             <a:fld id="{E4C50F65-6A6A-4013-82DA-696B9E833C7A}" type="datetimeFigureOut">
               <a:rPr lang="en-US" smtClean="0"/>
-              <a:t>2/23/2020</a:t>
+              <a:t>3/4/20</a:t>
             </a:fld>
             <a:endParaRPr lang="en-US"/>
           </a:p>
@@ -8163,10 +8126,9 @@
           <a:lstStyle/>
           <a:p>
             <a:r>
-              <a:rPr lang="en-US" dirty="0" smtClean="0"/>
+              <a:rPr lang="en-US" dirty="0"/>
               <a:t>41</a:t>
             </a:r>
-            <a:endParaRPr lang="en-US" dirty="0"/>
           </a:p>
         </p:txBody>
       </p:sp>
@@ -8202,18 +8164,13 @@
               <a:defRPr/>
             </a:pPr>
             <a:r>
-              <a:rPr lang="en-US" dirty="0" smtClean="0">
+              <a:rPr lang="en-US" dirty="0">
                 <a:solidFill>
                   <a:srgbClr val="0474EF"/>
                 </a:solidFill>
               </a:rPr>
               <a:t>Java</a:t>
             </a:r>
-            <a:endParaRPr lang="en-US" dirty="0">
-              <a:solidFill>
-                <a:srgbClr val="0474EF"/>
-              </a:solidFill>
-            </a:endParaRPr>
           </a:p>
         </p:txBody>
       </p:sp>
@@ -8256,7 +8213,6 @@
               </a:solidFill>
             </a:ln>
             <a:effectLst/>
-            <a:extLst/>
           </p:spPr>
           <p:txBody>
             <a:bodyPr rot="0" spcFirstLastPara="0" vertOverflow="overflow" horzOverflow="overflow" vert="horz" wrap="square" lIns="182880" tIns="45720" rIns="640080" bIns="45720" numCol="1" spcCol="0" rtlCol="0" fromWordArt="0" anchor="ctr" anchorCtr="0" forceAA="0" compatLnSpc="1">
@@ -8321,7 +8277,7 @@
         <p:spPr>
           <a:xfrm>
             <a:off x="550057" y="1660420"/>
-            <a:ext cx="10638016" cy="1277273"/>
+            <a:ext cx="10638016" cy="954107"/>
           </a:xfrm>
           <a:prstGeom prst="rect">
             <a:avLst/>
@@ -8343,7 +8299,7 @@
               <a:defRPr/>
             </a:pPr>
             <a:r>
-              <a:rPr lang="en-US" sz="1600" dirty="0" smtClean="0">
+              <a:rPr lang="en-US" sz="1600" dirty="0">
                 <a:solidFill>
                   <a:prstClr val="white">
                     <a:lumMod val="50000"/>
@@ -8366,7 +8322,7 @@
               <a:defRPr/>
             </a:pPr>
             <a:r>
-              <a:rPr lang="en-US" sz="1600" dirty="0" smtClean="0">
+              <a:rPr lang="en-US" sz="1600" dirty="0">
                 <a:solidFill>
                   <a:prstClr val="white">
                     <a:lumMod val="50000"/>
@@ -8379,100 +8335,6 @@
             </a:r>
           </a:p>
           <a:p>
-            <a:pPr marL="285750" indent="-285750">
-              <a:spcBef>
-                <a:spcPts val="290"/>
-              </a:spcBef>
-              <a:spcAft>
-                <a:spcPts val="290"/>
-              </a:spcAft>
-              <a:buFont typeface="Wingdings" panose="05000000000000000000" pitchFamily="2" charset="2"/>
-              <a:buChar char="§"/>
-              <a:defRPr/>
-            </a:pPr>
-            <a:r>
-              <a:rPr lang="en-US" sz="1600" dirty="0" smtClean="0">
-                <a:solidFill>
-                  <a:prstClr val="white">
-                    <a:lumMod val="50000"/>
-                  </a:prstClr>
-                </a:solidFill>
-                <a:latin typeface="Univers Next Arabic" panose="020B0503030202020203" pitchFamily="34" charset="-78"/>
-                <a:cs typeface="Univers Next Arabic" panose="020B0503030202020203" pitchFamily="34" charset="-78"/>
-              </a:rPr>
-              <a:t>This course is an 160 hours (40 lecture, 120 lab), starts on </a:t>
-            </a:r>
-            <a:r>
-              <a:rPr lang="en-US" sz="1600" b="1" dirty="0" smtClean="0">
-                <a:solidFill>
-                  <a:prstClr val="white">
-                    <a:lumMod val="50000"/>
-                  </a:prstClr>
-                </a:solidFill>
-                <a:latin typeface="Univers Next Arabic" panose="020B0503030202020203" pitchFamily="34" charset="-78"/>
-                <a:cs typeface="Univers Next Arabic" panose="020B0503030202020203" pitchFamily="34" charset="-78"/>
-              </a:rPr>
-              <a:t>28</a:t>
-            </a:r>
-            <a:r>
-              <a:rPr lang="en-US" sz="1600" b="1" baseline="30000" dirty="0" smtClean="0">
-                <a:solidFill>
-                  <a:prstClr val="white">
-                    <a:lumMod val="50000"/>
-                  </a:prstClr>
-                </a:solidFill>
-                <a:latin typeface="Univers Next Arabic" panose="020B0503030202020203" pitchFamily="34" charset="-78"/>
-                <a:cs typeface="Univers Next Arabic" panose="020B0503030202020203" pitchFamily="34" charset="-78"/>
-              </a:rPr>
-              <a:t>th</a:t>
-            </a:r>
-            <a:r>
-              <a:rPr lang="en-US" sz="1600" b="1" dirty="0" smtClean="0">
-                <a:solidFill>
-                  <a:prstClr val="white">
-                    <a:lumMod val="50000"/>
-                  </a:prstClr>
-                </a:solidFill>
-                <a:latin typeface="Univers Next Arabic" panose="020B0503030202020203" pitchFamily="34" charset="-78"/>
-                <a:cs typeface="Univers Next Arabic" panose="020B0503030202020203" pitchFamily="34" charset="-78"/>
-              </a:rPr>
-              <a:t> February– 21</a:t>
-            </a:r>
-            <a:r>
-              <a:rPr lang="en-US" sz="1600" b="1" baseline="30000" dirty="0" smtClean="0">
-                <a:solidFill>
-                  <a:prstClr val="white">
-                    <a:lumMod val="50000"/>
-                  </a:prstClr>
-                </a:solidFill>
-                <a:latin typeface="Univers Next Arabic" panose="020B0503030202020203" pitchFamily="34" charset="-78"/>
-                <a:cs typeface="Univers Next Arabic" panose="020B0503030202020203" pitchFamily="34" charset="-78"/>
-              </a:rPr>
-              <a:t>st</a:t>
-            </a:r>
-            <a:r>
-              <a:rPr lang="en-US" sz="1600" b="1" dirty="0" smtClean="0">
-                <a:solidFill>
-                  <a:prstClr val="white">
-                    <a:lumMod val="50000"/>
-                  </a:prstClr>
-                </a:solidFill>
-                <a:latin typeface="Univers Next Arabic" panose="020B0503030202020203" pitchFamily="34" charset="-78"/>
-                <a:cs typeface="Univers Next Arabic" panose="020B0503030202020203" pitchFamily="34" charset="-78"/>
-              </a:rPr>
-              <a:t> March.</a:t>
-            </a:r>
-            <a:endParaRPr lang="en-US" sz="1600" b="1" dirty="0">
-              <a:solidFill>
-                <a:prstClr val="white">
-                  <a:lumMod val="50000"/>
-                </a:prstClr>
-              </a:solidFill>
-              <a:latin typeface="Univers Next Arabic" panose="020B0503030202020203" pitchFamily="34" charset="-78"/>
-              <a:cs typeface="Univers Next Arabic" panose="020B0503030202020203" pitchFamily="34" charset="-78"/>
-            </a:endParaRPr>
-          </a:p>
-          <a:p>
             <a:pPr>
               <a:spcBef>
                 <a:spcPts val="290"/>
@@ -8482,15 +8344,18 @@
               </a:spcAft>
               <a:defRPr/>
             </a:pPr>
-            <a:endParaRPr lang="en-US" sz="1400" dirty="0">
-              <a:solidFill>
-                <a:schemeClr val="bg2">
-                  <a:lumMod val="50000"/>
-                </a:schemeClr>
-              </a:solidFill>
-              <a:latin typeface="Univers Next Arabic" panose="020B0503030202020203" pitchFamily="34" charset="-78"/>
-              <a:cs typeface="Univers Next Arabic" panose="020B0503030202020203" pitchFamily="34" charset="-78"/>
-            </a:endParaRPr>
+            <a:r>
+              <a:rPr lang="en-US" sz="1400" dirty="0">
+                <a:solidFill>
+                  <a:schemeClr val="bg2">
+                    <a:lumMod val="50000"/>
+                  </a:schemeClr>
+                </a:solidFill>
+                <a:latin typeface="Univers Next Arabic" panose="020B0503030202020203" pitchFamily="34" charset="-78"/>
+                <a:cs typeface="Univers Next Arabic" panose="020B0503030202020203" pitchFamily="34" charset="-78"/>
+              </a:rPr>
+              <a:t>TBD</a:t>
+            </a:r>
           </a:p>
         </p:txBody>
       </p:sp>
@@ -8640,7 +8505,7 @@
                 <a:defRPr/>
               </a:pPr>
               <a:r>
-                <a:rPr lang="en-US" sz="1600" dirty="0" smtClean="0">
+                <a:rPr lang="en-US" sz="1600" dirty="0">
                   <a:solidFill>
                     <a:prstClr val="white">
                       <a:lumMod val="50000"/>
@@ -8650,7 +8515,7 @@
                 <a:t> </a:t>
               </a:r>
               <a:r>
-                <a:rPr lang="en-US" sz="1600" dirty="0" smtClean="0">
+                <a:rPr lang="en-US" sz="1600" dirty="0">
                   <a:solidFill>
                     <a:prstClr val="white">
                       <a:lumMod val="50000"/>
@@ -8675,7 +8540,7 @@
                 <a:defRPr/>
               </a:pPr>
               <a:r>
-                <a:rPr lang="en-US" sz="1600" dirty="0" smtClean="0">
+                <a:rPr lang="en-US" sz="1600" dirty="0">
                   <a:solidFill>
                     <a:prstClr val="white">
                       <a:lumMod val="50000"/>
@@ -8686,15 +8551,6 @@
                 </a:rPr>
                 <a:t>…</a:t>
               </a:r>
-              <a:endParaRPr lang="en-US" sz="1600" dirty="0">
-                <a:solidFill>
-                  <a:prstClr val="white">
-                    <a:lumMod val="50000"/>
-                  </a:prstClr>
-                </a:solidFill>
-                <a:latin typeface="Univers Next Arabic" panose="020B0503030202020203" pitchFamily="34" charset="-78"/>
-                <a:cs typeface="Univers Next Arabic" panose="020B0503030202020203" pitchFamily="34" charset="-78"/>
-              </a:endParaRPr>
             </a:p>
             <a:p>
               <a:pPr marL="285750" indent="-285750" algn="just">
@@ -8709,7 +8565,7 @@
                 <a:defRPr/>
               </a:pPr>
               <a:r>
-                <a:rPr lang="en-US" sz="1600" dirty="0" smtClean="0">
+                <a:rPr lang="en-US" sz="1600" dirty="0">
                   <a:solidFill>
                     <a:prstClr val="white">
                       <a:lumMod val="50000"/>
@@ -8720,15 +8576,6 @@
                 </a:rPr>
                 <a:t>…</a:t>
               </a:r>
-              <a:endParaRPr lang="en-US" sz="1600" dirty="0">
-                <a:solidFill>
-                  <a:prstClr val="white">
-                    <a:lumMod val="50000"/>
-                  </a:prstClr>
-                </a:solidFill>
-                <a:latin typeface="Univers Next Arabic" panose="020B0503030202020203" pitchFamily="34" charset="-78"/>
-                <a:cs typeface="Univers Next Arabic" panose="020B0503030202020203" pitchFamily="34" charset="-78"/>
-              </a:endParaRPr>
             </a:p>
             <a:p>
               <a:pPr marL="285750" indent="-285750" algn="just">
@@ -8743,7 +8590,7 @@
                 <a:defRPr/>
               </a:pPr>
               <a:r>
-                <a:rPr lang="en-US" sz="1600" dirty="0" smtClean="0">
+                <a:rPr lang="en-US" sz="1600" dirty="0">
                   <a:solidFill>
                     <a:prstClr val="white">
                       <a:lumMod val="50000"/>
@@ -8822,7 +8669,7 @@
               <a:defRPr/>
             </a:pPr>
             <a:r>
-              <a:rPr lang="en-US" sz="1600" b="1" dirty="0" smtClean="0">
+              <a:rPr lang="en-US" sz="1600" b="1" dirty="0">
                 <a:solidFill>
                   <a:prstClr val="white"/>
                 </a:solidFill>
@@ -8831,13 +8678,6 @@
               </a:rPr>
               <a:t>Objectives:</a:t>
             </a:r>
-            <a:endParaRPr lang="en-US" sz="1600" b="1" dirty="0">
-              <a:solidFill>
-                <a:prstClr val="white"/>
-              </a:solidFill>
-              <a:latin typeface="Univers Next Arabic" panose="020B0503030202020203" pitchFamily="34" charset="-78"/>
-              <a:cs typeface="Univers Next Arabic" panose="020B0503030202020203" pitchFamily="34" charset="-78"/>
-            </a:endParaRPr>
           </a:p>
         </p:txBody>
       </p:sp>
@@ -8851,13 +8691,6 @@
   <p:clrMapOvr>
     <a:masterClrMapping/>
   </p:clrMapOvr>
-  <p:timing>
-    <p:tnLst>
-      <p:par>
-        <p:cTn id="1" dur="indefinite" restart="never" nodeType="tmRoot"/>
-      </p:par>
-    </p:tnLst>
-  </p:timing>
 </p:sld>
 </file>
 
@@ -8894,10 +8727,9 @@
           <a:lstStyle/>
           <a:p>
             <a:r>
-              <a:rPr lang="en-US" dirty="0" smtClean="0"/>
+              <a:rPr lang="en-US" dirty="0"/>
               <a:t>41</a:t>
             </a:r>
-            <a:endParaRPr lang="en-US" dirty="0"/>
           </a:p>
         </p:txBody>
       </p:sp>
@@ -8933,10 +8765,9 @@
               <a:defRPr/>
             </a:pPr>
             <a:r>
-              <a:rPr lang="en-US" dirty="0" smtClean="0"/>
+              <a:rPr lang="en-US" dirty="0"/>
               <a:t>(…) Group Project Requirements</a:t>
             </a:r>
-            <a:endParaRPr lang="en-US" dirty="0"/>
           </a:p>
         </p:txBody>
       </p:sp>
@@ -8979,7 +8810,6 @@
               </a:solidFill>
             </a:ln>
             <a:effectLst/>
-            <a:extLst/>
           </p:spPr>
           <p:txBody>
             <a:bodyPr rot="0" spcFirstLastPara="0" vertOverflow="overflow" horzOverflow="overflow" vert="horz" wrap="square" lIns="182880" tIns="45720" rIns="640080" bIns="45720" numCol="1" spcCol="0" rtlCol="0" fromWordArt="0" anchor="ctr" anchorCtr="0" forceAA="0" compatLnSpc="1">
@@ -9066,22 +8896,15 @@
               <a:defRPr/>
             </a:pPr>
             <a:r>
-              <a:rPr lang="en-US" sz="1600" dirty="0" smtClean="0">
+              <a:rPr lang="en-US" sz="1600" dirty="0">
                 <a:solidFill>
                   <a:srgbClr val="0474EF"/>
                 </a:solidFill>
                 <a:latin typeface="Univers Next Arabic" panose="020B0503030202020203" pitchFamily="34" charset="-78"/>
                 <a:cs typeface="Univers Next Arabic" panose="020B0503030202020203" pitchFamily="34" charset="-78"/>
               </a:rPr>
-              <a:t>Project Overview</a:t>
+              <a:t>Project Overview : TBD</a:t>
             </a:r>
-            <a:endParaRPr lang="en-US" sz="1600" dirty="0">
-              <a:solidFill>
-                <a:srgbClr val="0474EF"/>
-              </a:solidFill>
-              <a:latin typeface="Univers Next Arabic" panose="020B0503030202020203" pitchFamily="34" charset="-78"/>
-              <a:cs typeface="Univers Next Arabic" panose="020B0503030202020203" pitchFamily="34" charset="-78"/>
-            </a:endParaRPr>
           </a:p>
         </p:txBody>
       </p:sp>
@@ -9123,7 +8946,6 @@
               </a:solidFill>
             </a:ln>
             <a:effectLst/>
-            <a:extLst/>
           </p:spPr>
           <p:txBody>
             <a:bodyPr rot="0" spcFirstLastPara="0" vertOverflow="overflow" horzOverflow="overflow" vert="horz" wrap="square" lIns="182880" tIns="45720" rIns="640080" bIns="45720" numCol="1" spcCol="0" rtlCol="0" fromWordArt="0" anchor="ctr" anchorCtr="0" forceAA="0" compatLnSpc="1">
@@ -9219,7 +9041,6 @@
               </a:solidFill>
             </a:ln>
             <a:effectLst/>
-            <a:extLst/>
           </p:spPr>
           <p:txBody>
             <a:bodyPr rot="0" spcFirstLastPara="0" vertOverflow="overflow" horzOverflow="overflow" vert="horz" wrap="square" lIns="182880" tIns="45720" rIns="640080" bIns="45720" numCol="1" spcCol="0" rtlCol="0" fromWordArt="0" anchor="ctr" anchorCtr="0" forceAA="0" compatLnSpc="1">
@@ -9275,56 +9096,6 @@
           </p:txBody>
         </p:sp>
       </p:grpSp>
-      <p:sp>
-        <p:nvSpPr>
-          <p:cNvPr id="26" name="Rectangle 25"/>
-          <p:cNvSpPr/>
-          <p:nvPr/>
-        </p:nvSpPr>
-        <p:spPr>
-          <a:xfrm>
-            <a:off x="539425" y="3207703"/>
-            <a:ext cx="10638016" cy="338554"/>
-          </a:xfrm>
-          <a:prstGeom prst="rect">
-            <a:avLst/>
-          </a:prstGeom>
-        </p:spPr>
-        <p:txBody>
-          <a:bodyPr wrap="square" anchor="t">
-            <a:spAutoFit/>
-          </a:bodyPr>
-          <a:lstStyle/>
-          <a:p>
-            <a:pPr algn="just">
-              <a:spcBef>
-                <a:spcPts val="290"/>
-              </a:spcBef>
-              <a:spcAft>
-                <a:spcPts val="290"/>
-              </a:spcAft>
-              <a:defRPr/>
-            </a:pPr>
-            <a:r>
-              <a:rPr lang="en-US" sz="1600" dirty="0" smtClean="0">
-                <a:solidFill>
-                  <a:srgbClr val="0474EF"/>
-                </a:solidFill>
-                <a:latin typeface="Univers Next Arabic" panose="020B0503030202020203" pitchFamily="34" charset="-78"/>
-                <a:cs typeface="Univers Next Arabic" panose="020B0503030202020203" pitchFamily="34" charset="-78"/>
-              </a:rPr>
-              <a:t>Groups Ideas </a:t>
-            </a:r>
-            <a:endParaRPr lang="en-US" sz="1600" dirty="0">
-              <a:solidFill>
-                <a:srgbClr val="0474EF"/>
-              </a:solidFill>
-              <a:latin typeface="Univers Next Arabic" panose="020B0503030202020203" pitchFamily="34" charset="-78"/>
-              <a:cs typeface="Univers Next Arabic" panose="020B0503030202020203" pitchFamily="34" charset="-78"/>
-            </a:endParaRPr>
-          </a:p>
-        </p:txBody>
-      </p:sp>
       <p:grpSp>
         <p:nvGrpSpPr>
           <p:cNvPr id="27" name="Group 26"/>
@@ -9363,7 +9134,6 @@
               </a:solidFill>
             </a:ln>
             <a:effectLst/>
-            <a:extLst/>
           </p:spPr>
           <p:txBody>
             <a:bodyPr rot="0" spcFirstLastPara="0" vertOverflow="overflow" horzOverflow="overflow" vert="horz" wrap="square" lIns="182880" tIns="45720" rIns="640080" bIns="45720" numCol="1" spcCol="0" rtlCol="0" fromWordArt="0" anchor="ctr" anchorCtr="0" forceAA="0" compatLnSpc="1">
@@ -9430,13 +9200,6 @@
   <p:clrMapOvr>
     <a:masterClrMapping/>
   </p:clrMapOvr>
-  <p:timing>
-    <p:tnLst>
-      <p:par>
-        <p:cTn id="1" dur="indefinite" restart="never" nodeType="tmRoot"/>
-      </p:par>
-    </p:tnLst>
-  </p:timing>
 </p:sld>
 </file>
 
@@ -9478,10 +9241,9 @@
           <a:lstStyle/>
           <a:p>
             <a:r>
-              <a:rPr lang="en-US" dirty="0" smtClean="0"/>
-              <a:t>Project name </a:t>
+              <a:rPr lang="en-US" dirty="0"/>
+              <a:t>Employees Management System</a:t>
             </a:r>
-            <a:endParaRPr lang="en-US" dirty="0"/>
           </a:p>
         </p:txBody>
       </p:sp>
@@ -9530,22 +9292,15 @@
           <a:lstStyle/>
           <a:p>
             <a:r>
-              <a:rPr lang="en-US" sz="1600" dirty="0" smtClean="0">
+              <a:rPr lang="en-US" sz="1600" dirty="0">
                 <a:solidFill>
                   <a:srgbClr val="0474EF"/>
                 </a:solidFill>
                 <a:latin typeface="Univers Next Arabic" panose="020B0503030202020203" pitchFamily="34" charset="-78"/>
                 <a:cs typeface="Univers Next Arabic" panose="020B0503030202020203" pitchFamily="34" charset="-78"/>
               </a:rPr>
-              <a:t>Team1:Bright Future</a:t>
+              <a:t>Team1:QA Engineers</a:t>
             </a:r>
-            <a:endParaRPr lang="en-US" sz="1600" dirty="0">
-              <a:solidFill>
-                <a:srgbClr val="0474EF"/>
-              </a:solidFill>
-              <a:latin typeface="Univers Next Arabic" panose="020B0503030202020203" pitchFamily="34" charset="-78"/>
-              <a:cs typeface="Univers Next Arabic" panose="020B0503030202020203" pitchFamily="34" charset="-78"/>
-            </a:endParaRPr>
           </a:p>
         </p:txBody>
       </p:sp>
@@ -9588,7 +9343,6 @@
               </a:solidFill>
             </a:ln>
             <a:effectLst/>
-            <a:extLst/>
           </p:spPr>
           <p:txBody>
             <a:bodyPr rot="0" spcFirstLastPara="0" vertOverflow="overflow" horzOverflow="overflow" vert="horz" wrap="square" lIns="182880" tIns="45720" rIns="640080" bIns="45720" numCol="1" spcCol="0" rtlCol="0" fromWordArt="0" anchor="ctr" anchorCtr="0" forceAA="0" compatLnSpc="1">
@@ -9629,7 +9383,7 @@
             </a:bodyPr>
             <a:lstStyle/>
             <a:p>
-              <a:pPr algn="r" rtl="1"/>
+              <a:pPr marL="0" algn="l" defTabSz="914400" rtl="0" eaLnBrk="1" latinLnBrk="0" hangingPunct="1"/>
               <a:endParaRPr lang="en-US" sz="2400" b="1" dirty="0">
                 <a:solidFill>
                   <a:schemeClr val="bg1">
@@ -9653,7 +9407,7 @@
         <p:spPr>
           <a:xfrm>
             <a:off x="418213" y="1480563"/>
-            <a:ext cx="10638016" cy="338554"/>
+            <a:ext cx="10638016" cy="584775"/>
           </a:xfrm>
           <a:prstGeom prst="rect">
             <a:avLst/>
@@ -9675,22 +9429,15 @@
               <a:defRPr/>
             </a:pPr>
             <a:r>
-              <a:rPr lang="en-US" sz="1600" dirty="0" smtClean="0">
+              <a:rPr lang="en-US" sz="1600" dirty="0">
                 <a:solidFill>
                   <a:srgbClr val="0474EF"/>
                 </a:solidFill>
                 <a:latin typeface="Univers Next Arabic" panose="020B0503030202020203" pitchFamily="34" charset="-78"/>
                 <a:cs typeface="Univers Next Arabic" panose="020B0503030202020203" pitchFamily="34" charset="-78"/>
               </a:rPr>
-              <a:t>Project Description:</a:t>
+              <a:t>Project Description: building an employees management system that executes CRUD in commands using Spring Boot.  </a:t>
             </a:r>
-            <a:endParaRPr lang="en-US" sz="1600" dirty="0">
-              <a:solidFill>
-                <a:srgbClr val="0474EF"/>
-              </a:solidFill>
-              <a:latin typeface="Univers Next Arabic" panose="020B0503030202020203" pitchFamily="34" charset="-78"/>
-              <a:cs typeface="Univers Next Arabic" panose="020B0503030202020203" pitchFamily="34" charset="-78"/>
-            </a:endParaRPr>
           </a:p>
         </p:txBody>
       </p:sp>
@@ -9732,7 +9479,6 @@
               </a:solidFill>
             </a:ln>
             <a:effectLst/>
-            <a:extLst/>
           </p:spPr>
           <p:txBody>
             <a:bodyPr rot="0" spcFirstLastPara="0" vertOverflow="overflow" horzOverflow="overflow" vert="horz" wrap="square" lIns="182880" tIns="45720" rIns="640080" bIns="45720" numCol="1" spcCol="0" rtlCol="0" fromWordArt="0" anchor="ctr" anchorCtr="0" forceAA="0" compatLnSpc="1">
@@ -9828,7 +9574,6 @@
               </a:solidFill>
             </a:ln>
             <a:effectLst/>
-            <a:extLst/>
           </p:spPr>
           <p:txBody>
             <a:bodyPr rot="0" spcFirstLastPara="0" vertOverflow="overflow" horzOverflow="overflow" vert="horz" wrap="square" lIns="182880" tIns="45720" rIns="640080" bIns="45720" numCol="1" spcCol="0" rtlCol="0" fromWordArt="0" anchor="ctr" anchorCtr="0" forceAA="0" compatLnSpc="1">
@@ -9922,25 +9667,8 @@
                 <a:latin typeface="Univers Next Arabic" panose="020B0503030202020203" pitchFamily="34" charset="-78"/>
                 <a:cs typeface="Univers Next Arabic" panose="020B0503030202020203" pitchFamily="34" charset="-78"/>
               </a:rPr>
-              <a:t>Team </a:t>
+              <a:t>Team Members</a:t>
             </a:r>
-            <a:r>
-              <a:rPr lang="en-US" sz="1600" dirty="0" smtClean="0">
-                <a:solidFill>
-                  <a:srgbClr val="0474EF"/>
-                </a:solidFill>
-                <a:latin typeface="Univers Next Arabic" panose="020B0503030202020203" pitchFamily="34" charset="-78"/>
-                <a:cs typeface="Univers Next Arabic" panose="020B0503030202020203" pitchFamily="34" charset="-78"/>
-              </a:rPr>
-              <a:t>Members</a:t>
-            </a:r>
-            <a:endParaRPr lang="en-US" sz="1600" dirty="0">
-              <a:solidFill>
-                <a:srgbClr val="0474EF"/>
-              </a:solidFill>
-              <a:latin typeface="Univers Next Arabic" panose="020B0503030202020203" pitchFamily="34" charset="-78"/>
-              <a:cs typeface="Univers Next Arabic" panose="020B0503030202020203" pitchFamily="34" charset="-78"/>
-            </a:endParaRPr>
           </a:p>
         </p:txBody>
       </p:sp>
@@ -9982,7 +9710,6 @@
               </a:solidFill>
             </a:ln>
             <a:effectLst/>
-            <a:extLst/>
           </p:spPr>
           <p:txBody>
             <a:bodyPr rot="0" spcFirstLastPara="0" vertOverflow="overflow" horzOverflow="overflow" vert="horz" wrap="square" lIns="182880" tIns="45720" rIns="640080" bIns="45720" numCol="1" spcCol="0" rtlCol="0" fromWordArt="0" anchor="ctr" anchorCtr="0" forceAA="0" compatLnSpc="1">
@@ -10117,7 +9844,7 @@
           </a:p>
           <a:p>
             <a:r>
-              <a:rPr lang="en-US" sz="1600" dirty="0" smtClean="0">
+              <a:rPr lang="en-US" sz="1600" dirty="0">
                 <a:solidFill>
                   <a:prstClr val="white">
                     <a:lumMod val="50000"/>
@@ -10128,6 +9855,8 @@
               </a:rPr>
               <a:t> </a:t>
             </a:r>
+          </a:p>
+          <a:p>
             <a:endParaRPr lang="en-US" sz="1600" dirty="0">
               <a:solidFill>
                 <a:prstClr val="white">
@@ -10139,17 +9868,6 @@
             </a:endParaRPr>
           </a:p>
           <a:p>
-            <a:endParaRPr lang="en-US" sz="1600" dirty="0" smtClean="0">
-              <a:solidFill>
-                <a:prstClr val="white">
-                  <a:lumMod val="50000"/>
-                </a:prstClr>
-              </a:solidFill>
-              <a:latin typeface="Univers Next Arabic" panose="020B0503030202020203" pitchFamily="34" charset="-78"/>
-              <a:cs typeface="Univers Next Arabic" panose="020B0503030202020203" pitchFamily="34" charset="-78"/>
-            </a:endParaRPr>
-          </a:p>
-          <a:p>
             <a:endParaRPr lang="en-US" sz="1600" dirty="0">
               <a:solidFill>
                 <a:prstClr val="white">
@@ -10171,7 +9889,7 @@
         <p:spPr>
           <a:xfrm>
             <a:off x="429421" y="4426500"/>
-            <a:ext cx="6096000" cy="1323439"/>
+            <a:ext cx="6096000" cy="1077218"/>
           </a:xfrm>
           <a:prstGeom prst="rect">
             <a:avLst/>
@@ -10188,7 +9906,43 @@
               <a:buChar char="§"/>
             </a:pPr>
             <a:r>
-              <a:rPr lang="en-GB" sz="1600" dirty="0" smtClean="0">
+              <a:rPr lang="en-GB" sz="1600" dirty="0">
+                <a:solidFill>
+                  <a:prstClr val="white">
+                    <a:lumMod val="50000"/>
+                  </a:prstClr>
+                </a:solidFill>
+                <a:latin typeface="Univers Next Arabic" panose="020B0503030202020203" pitchFamily="34" charset="-78"/>
+                <a:cs typeface="Univers Next Arabic" panose="020B0503030202020203" pitchFamily="34" charset="-78"/>
+              </a:rPr>
+              <a:t>Talal</a:t>
+            </a:r>
+          </a:p>
+          <a:p>
+            <a:pPr marL="457200" indent="-457200">
+              <a:buFont typeface="Wingdings" panose="05000000000000000000" pitchFamily="2" charset="2"/>
+              <a:buChar char="§"/>
+            </a:pPr>
+            <a:r>
+              <a:rPr lang="en-GB" sz="1600" dirty="0">
+                <a:solidFill>
+                  <a:prstClr val="white">
+                    <a:lumMod val="50000"/>
+                  </a:prstClr>
+                </a:solidFill>
+                <a:latin typeface="Univers Next Arabic" panose="020B0503030202020203" pitchFamily="34" charset="-78"/>
+                <a:cs typeface="Univers Next Arabic" panose="020B0503030202020203" pitchFamily="34" charset="-78"/>
+              </a:rPr>
+              <a:t>Mohammad</a:t>
+            </a:r>
+          </a:p>
+          <a:p>
+            <a:pPr marL="457200" indent="-457200">
+              <a:buFont typeface="Wingdings" panose="05000000000000000000" pitchFamily="2" charset="2"/>
+              <a:buChar char="§"/>
+            </a:pPr>
+            <a:r>
+              <a:rPr lang="en-GB" sz="1600" dirty="0">
                 <a:solidFill>
                   <a:prstClr val="white">
                     <a:lumMod val="50000"/>
@@ -10199,15 +9953,6 @@
               </a:rPr>
               <a:t>Abdullah</a:t>
             </a:r>
-            <a:endParaRPr lang="en-GB" sz="1600" dirty="0">
-              <a:solidFill>
-                <a:prstClr val="white">
-                  <a:lumMod val="50000"/>
-                </a:prstClr>
-              </a:solidFill>
-              <a:latin typeface="Univers Next Arabic" panose="020B0503030202020203" pitchFamily="34" charset="-78"/>
-              <a:cs typeface="Univers Next Arabic" panose="020B0503030202020203" pitchFamily="34" charset="-78"/>
-            </a:endParaRPr>
           </a:p>
           <a:p>
             <a:pPr marL="457200" indent="-457200">
@@ -10215,7 +9960,7 @@
               <a:buChar char="§"/>
             </a:pPr>
             <a:r>
-              <a:rPr lang="en-GB" sz="1600" dirty="0" smtClean="0">
+              <a:rPr lang="en-GB" sz="1600" dirty="0">
                 <a:solidFill>
                   <a:prstClr val="white">
                     <a:lumMod val="50000"/>
@@ -10224,98 +9969,8 @@
                 <a:latin typeface="Univers Next Arabic" panose="020B0503030202020203" pitchFamily="34" charset="-78"/>
                 <a:cs typeface="Univers Next Arabic" panose="020B0503030202020203" pitchFamily="34" charset="-78"/>
               </a:rPr>
-              <a:t>Mohammad</a:t>
+              <a:t>Yahya</a:t>
             </a:r>
-            <a:endParaRPr lang="en-GB" sz="1600" dirty="0">
-              <a:solidFill>
-                <a:prstClr val="white">
-                  <a:lumMod val="50000"/>
-                </a:prstClr>
-              </a:solidFill>
-              <a:latin typeface="Univers Next Arabic" panose="020B0503030202020203" pitchFamily="34" charset="-78"/>
-              <a:cs typeface="Univers Next Arabic" panose="020B0503030202020203" pitchFamily="34" charset="-78"/>
-            </a:endParaRPr>
-          </a:p>
-          <a:p>
-            <a:pPr marL="457200" indent="-457200">
-              <a:buFont typeface="Wingdings" panose="05000000000000000000" pitchFamily="2" charset="2"/>
-              <a:buChar char="§"/>
-            </a:pPr>
-            <a:r>
-              <a:rPr lang="en-GB" sz="1600" dirty="0" smtClean="0">
-                <a:solidFill>
-                  <a:prstClr val="white">
-                    <a:lumMod val="50000"/>
-                  </a:prstClr>
-                </a:solidFill>
-                <a:latin typeface="Univers Next Arabic" panose="020B0503030202020203" pitchFamily="34" charset="-78"/>
-                <a:cs typeface="Univers Next Arabic" panose="020B0503030202020203" pitchFamily="34" charset="-78"/>
-              </a:rPr>
-              <a:t>Ali</a:t>
-            </a:r>
-            <a:endParaRPr lang="en-GB" sz="1600" dirty="0">
-              <a:solidFill>
-                <a:prstClr val="white">
-                  <a:lumMod val="50000"/>
-                </a:prstClr>
-              </a:solidFill>
-              <a:latin typeface="Univers Next Arabic" panose="020B0503030202020203" pitchFamily="34" charset="-78"/>
-              <a:cs typeface="Univers Next Arabic" panose="020B0503030202020203" pitchFamily="34" charset="-78"/>
-            </a:endParaRPr>
-          </a:p>
-          <a:p>
-            <a:pPr marL="457200" indent="-457200">
-              <a:buFont typeface="Wingdings" panose="05000000000000000000" pitchFamily="2" charset="2"/>
-              <a:buChar char="§"/>
-            </a:pPr>
-            <a:r>
-              <a:rPr lang="en-GB" sz="1600" dirty="0" smtClean="0">
-                <a:solidFill>
-                  <a:prstClr val="white">
-                    <a:lumMod val="50000"/>
-                  </a:prstClr>
-                </a:solidFill>
-                <a:latin typeface="Univers Next Arabic" panose="020B0503030202020203" pitchFamily="34" charset="-78"/>
-                <a:cs typeface="Univers Next Arabic" panose="020B0503030202020203" pitchFamily="34" charset="-78"/>
-              </a:rPr>
-              <a:t>Ibrahim</a:t>
-            </a:r>
-            <a:endParaRPr lang="en-GB" sz="1600" dirty="0">
-              <a:solidFill>
-                <a:prstClr val="white">
-                  <a:lumMod val="50000"/>
-                </a:prstClr>
-              </a:solidFill>
-              <a:latin typeface="Univers Next Arabic" panose="020B0503030202020203" pitchFamily="34" charset="-78"/>
-              <a:cs typeface="Univers Next Arabic" panose="020B0503030202020203" pitchFamily="34" charset="-78"/>
-            </a:endParaRPr>
-          </a:p>
-          <a:p>
-            <a:pPr marL="457200" indent="-457200">
-              <a:buFont typeface="Wingdings" panose="05000000000000000000" pitchFamily="2" charset="2"/>
-              <a:buChar char="§"/>
-            </a:pPr>
-            <a:r>
-              <a:rPr lang="en-GB" sz="1600" dirty="0" err="1" smtClean="0">
-                <a:solidFill>
-                  <a:prstClr val="white">
-                    <a:lumMod val="50000"/>
-                  </a:prstClr>
-                </a:solidFill>
-                <a:latin typeface="Univers Next Arabic" panose="020B0503030202020203" pitchFamily="34" charset="-78"/>
-                <a:cs typeface="Univers Next Arabic" panose="020B0503030202020203" pitchFamily="34" charset="-78"/>
-              </a:rPr>
-              <a:t>Nawaf</a:t>
-            </a:r>
-            <a:endParaRPr lang="en-GB" sz="1600" dirty="0">
-              <a:solidFill>
-                <a:prstClr val="white">
-                  <a:lumMod val="50000"/>
-                </a:prstClr>
-              </a:solidFill>
-              <a:latin typeface="Univers Next Arabic" panose="020B0503030202020203" pitchFamily="34" charset="-78"/>
-              <a:cs typeface="Univers Next Arabic" panose="020B0503030202020203" pitchFamily="34" charset="-78"/>
-            </a:endParaRPr>
           </a:p>
         </p:txBody>
       </p:sp>
@@ -10329,13 +9984,6 @@
   <p:clrMapOvr>
     <a:masterClrMapping/>
   </p:clrMapOvr>
-  <p:timing>
-    <p:tnLst>
-      <p:par>
-        <p:cTn id="1" dur="indefinite" restart="never" nodeType="tmRoot"/>
-      </p:par>
-    </p:tnLst>
-  </p:timing>
 </p:sld>
 </file>
 
@@ -10377,10 +10025,9 @@
           <a:lstStyle/>
           <a:p>
             <a:r>
-              <a:rPr lang="en-US" dirty="0" smtClean="0"/>
+              <a:rPr lang="en-US" dirty="0"/>
               <a:t>Project Pictures </a:t>
             </a:r>
-            <a:endParaRPr lang="en-US" dirty="0"/>
           </a:p>
         </p:txBody>
       </p:sp>
@@ -10404,47 +10051,6 @@
               <a:t>4</a:t>
             </a:fld>
             <a:endParaRPr lang="en-US"/>
-          </a:p>
-        </p:txBody>
-      </p:sp>
-      <p:sp>
-        <p:nvSpPr>
-          <p:cNvPr id="4" name="Rectangle 3"/>
-          <p:cNvSpPr/>
-          <p:nvPr/>
-        </p:nvSpPr>
-        <p:spPr>
-          <a:xfrm>
-            <a:off x="194412" y="724073"/>
-            <a:ext cx="8786037" cy="338554"/>
-          </a:xfrm>
-          <a:prstGeom prst="rect">
-            <a:avLst/>
-          </a:prstGeom>
-        </p:spPr>
-        <p:txBody>
-          <a:bodyPr wrap="square">
-            <a:spAutoFit/>
-          </a:bodyPr>
-          <a:lstStyle/>
-          <a:p>
-            <a:r>
-              <a:rPr lang="en-US" sz="1600" dirty="0" smtClean="0">
-                <a:solidFill>
-                  <a:srgbClr val="0474EF"/>
-                </a:solidFill>
-                <a:latin typeface="Univers Next Arabic" panose="020B0503030202020203" pitchFamily="34" charset="-78"/>
-                <a:cs typeface="Univers Next Arabic" panose="020B0503030202020203" pitchFamily="34" charset="-78"/>
-              </a:rPr>
-              <a:t>Team1: Bright Future</a:t>
-            </a:r>
-            <a:endParaRPr lang="en-US" sz="1600" dirty="0">
-              <a:solidFill>
-                <a:srgbClr val="0474EF"/>
-              </a:solidFill>
-              <a:latin typeface="Univers Next Arabic" panose="020B0503030202020203" pitchFamily="34" charset="-78"/>
-              <a:cs typeface="Univers Next Arabic" panose="020B0503030202020203" pitchFamily="34" charset="-78"/>
-            </a:endParaRPr>
           </a:p>
         </p:txBody>
       </p:sp>
@@ -10504,13 +10110,6 @@
   <p:clrMapOvr>
     <a:masterClrMapping/>
   </p:clrMapOvr>
-  <p:timing>
-    <p:tnLst>
-      <p:par>
-        <p:cTn id="1" dur="indefinite" restart="never" nodeType="tmRoot"/>
-      </p:par>
-    </p:tnLst>
-  </p:timing>
 </p:sld>
 </file>
 
@@ -10547,10 +10146,9 @@
           <a:lstStyle/>
           <a:p>
             <a:r>
-              <a:rPr lang="en-US" dirty="0" smtClean="0"/>
+              <a:rPr lang="en-US" dirty="0"/>
               <a:t>In-Class Pictures</a:t>
             </a:r>
-            <a:endParaRPr lang="en-US" dirty="0"/>
           </a:p>
         </p:txBody>
       </p:sp>
@@ -10709,13 +10307,6 @@
   <p:clrMapOvr>
     <a:masterClrMapping/>
   </p:clrMapOvr>
-  <p:timing>
-    <p:tnLst>
-      <p:par>
-        <p:cTn id="1" dur="indefinite" restart="never" nodeType="tmRoot"/>
-      </p:par>
-    </p:tnLst>
-  </p:timing>
 </p:sld>
 </file>
 
@@ -10752,10 +10343,9 @@
           <a:lstStyle/>
           <a:p>
             <a:r>
-              <a:rPr lang="en-US" dirty="0" smtClean="0"/>
+              <a:rPr lang="en-US" dirty="0"/>
               <a:t>Assignments</a:t>
             </a:r>
-            <a:endParaRPr lang="en-US" dirty="0"/>
           </a:p>
         </p:txBody>
       </p:sp>
@@ -10914,13 +10504,6 @@
   <p:clrMapOvr>
     <a:masterClrMapping/>
   </p:clrMapOvr>
-  <p:timing>
-    <p:tnLst>
-      <p:par>
-        <p:cTn id="1" dur="indefinite" restart="never" nodeType="tmRoot"/>
-      </p:par>
-    </p:tnLst>
-  </p:timing>
 </p:sld>
 </file>
 
@@ -10957,14 +10540,14 @@
           <a:lstStyle/>
           <a:p>
             <a:r>
-              <a:rPr lang="en-US" dirty="0" smtClean="0">
+              <a:rPr lang="en-US" dirty="0">
                 <a:latin typeface="Univers Next Arabic" panose="020B0503030202020203" pitchFamily="34" charset="-78"/>
                 <a:cs typeface="Univers Next Arabic" panose="020B0503030202020203" pitchFamily="34" charset="-78"/>
               </a:rPr>
               <a:t>   </a:t>
             </a:r>
             <a:r>
-              <a:rPr lang="ar-SA" dirty="0" smtClean="0">
+              <a:rPr lang="ar-SA" dirty="0">
                 <a:latin typeface="Univers Next Arabic" panose="020B0503030202020203" pitchFamily="34" charset="-78"/>
                 <a:cs typeface="Univers Next Arabic" panose="020B0503030202020203" pitchFamily="34" charset="-78"/>
               </a:rPr>
@@ -11058,7 +10641,6 @@
               </a:solidFill>
             </a:ln>
             <a:effectLst/>
-            <a:extLst/>
           </p:spPr>
           <p:txBody>
             <a:bodyPr rot="0" spcFirstLastPara="0" vertOverflow="overflow" horzOverflow="overflow" vert="horz" wrap="square" lIns="182880" tIns="45720" rIns="640080" bIns="45720" numCol="1" spcCol="0" rtlCol="0" fromWordArt="0" anchor="ctr" anchorCtr="0" forceAA="0" compatLnSpc="1">
@@ -11070,7 +10652,7 @@
             <a:lstStyle/>
             <a:p>
               <a:pPr algn="ctr"/>
-              <a:endParaRPr lang="en-US" dirty="0" smtClean="0">
+              <a:endParaRPr lang="en-US" dirty="0">
                 <a:solidFill>
                   <a:srgbClr val="0075ED"/>
                 </a:solidFill>
@@ -11335,7 +10917,6 @@
               </a:solidFill>
             </a:ln>
             <a:effectLst/>
-            <a:extLst/>
           </p:spPr>
           <p:txBody>
             <a:bodyPr rot="0" spcFirstLastPara="0" vertOverflow="overflow" horzOverflow="overflow" vert="horz" wrap="square" lIns="182880" tIns="45720" rIns="640080" bIns="45720" numCol="1" spcCol="0" rtlCol="0" fromWordArt="0" anchor="ctr" anchorCtr="0" forceAA="0" compatLnSpc="1">
@@ -11347,7 +10928,7 @@
             <a:lstStyle/>
             <a:p>
               <a:pPr algn="ctr"/>
-              <a:endParaRPr lang="en-US" dirty="0" smtClean="0">
+              <a:endParaRPr lang="en-US" dirty="0">
                 <a:solidFill>
                   <a:srgbClr val="0075ED"/>
                 </a:solidFill>
@@ -11415,7 +10996,7 @@
           <a:lstStyle/>
           <a:p>
             <a:r>
-              <a:rPr lang="en-US" sz="1600" dirty="0" smtClean="0">
+              <a:rPr lang="en-US" sz="1600" dirty="0">
                 <a:solidFill>
                   <a:srgbClr val="0474EF"/>
                 </a:solidFill>
@@ -11424,13 +11005,6 @@
               </a:rPr>
               <a:t>Assignments Completed</a:t>
             </a:r>
-            <a:endParaRPr lang="en-US" sz="1600" dirty="0">
-              <a:solidFill>
-                <a:srgbClr val="0474EF"/>
-              </a:solidFill>
-              <a:latin typeface="Univers Next Arabic" panose="020B0503030202020203" pitchFamily="34" charset="-78"/>
-              <a:cs typeface="Univers Next Arabic" panose="020B0503030202020203" pitchFamily="34" charset="-78"/>
-            </a:endParaRPr>
           </a:p>
         </p:txBody>
       </p:sp>
@@ -11520,16 +11094,6 @@
           <a:lstStyle/>
           <a:p>
             <a:r>
-              <a:rPr lang="en-US" sz="1600" dirty="0" smtClean="0">
-                <a:solidFill>
-                  <a:schemeClr val="bg1"/>
-                </a:solidFill>
-                <a:latin typeface="Univers Next Arabic" panose="020B0503030202020203" pitchFamily="34" charset="-78"/>
-                <a:cs typeface="Univers Next Arabic" panose="020B0503030202020203" pitchFamily="34" charset="-78"/>
-              </a:rPr>
-              <a:t>Example </a:t>
-            </a:r>
-            <a:r>
               <a:rPr lang="en-US" sz="1600" dirty="0">
                 <a:solidFill>
                   <a:schemeClr val="bg1"/>
@@ -11537,7 +11101,7 @@
                 <a:latin typeface="Univers Next Arabic" panose="020B0503030202020203" pitchFamily="34" charset="-78"/>
                 <a:cs typeface="Univers Next Arabic" panose="020B0503030202020203" pitchFamily="34" charset="-78"/>
               </a:rPr>
-              <a:t>of given Assignment and the overall evaluation:</a:t>
+              <a:t>Example of given Assignment and the overall evaluation:</a:t>
             </a:r>
           </a:p>
         </p:txBody>
@@ -11592,25 +11156,8 @@
                 <a:latin typeface="Univers Next Arabic" panose="020B0503030202020203" pitchFamily="34" charset="-78"/>
                 <a:cs typeface="Univers Next Arabic" panose="020B0503030202020203" pitchFamily="34" charset="-78"/>
               </a:rPr>
-              <a:t>Average Student </a:t>
+              <a:t>Average Student Score: 10/10 </a:t>
             </a:r>
-            <a:r>
-              <a:rPr lang="en-US" sz="1600" dirty="0" smtClean="0">
-                <a:solidFill>
-                  <a:schemeClr val="bg1"/>
-                </a:solidFill>
-                <a:latin typeface="Univers Next Arabic" panose="020B0503030202020203" pitchFamily="34" charset="-78"/>
-                <a:cs typeface="Univers Next Arabic" panose="020B0503030202020203" pitchFamily="34" charset="-78"/>
-              </a:rPr>
-              <a:t>Score: 10/10 </a:t>
-            </a:r>
-            <a:endParaRPr lang="en-US" sz="1600" dirty="0">
-              <a:solidFill>
-                <a:schemeClr val="bg1"/>
-              </a:solidFill>
-              <a:latin typeface="Univers Next Arabic" panose="020B0503030202020203" pitchFamily="34" charset="-78"/>
-              <a:cs typeface="Univers Next Arabic" panose="020B0503030202020203" pitchFamily="34" charset="-78"/>
-            </a:endParaRPr>
           </a:p>
         </p:txBody>
       </p:sp>
@@ -11653,7 +11200,6 @@
               </a:solidFill>
             </a:ln>
             <a:effectLst/>
-            <a:extLst/>
           </p:spPr>
           <p:txBody>
             <a:bodyPr rot="0" spcFirstLastPara="0" vertOverflow="overflow" horzOverflow="overflow" vert="horz" wrap="square" lIns="182880" tIns="45720" rIns="640080" bIns="45720" numCol="1" spcCol="0" rtlCol="0" fromWordArt="0" anchor="ctr" anchorCtr="0" forceAA="0" compatLnSpc="1">
@@ -11665,7 +11211,7 @@
             <a:lstStyle/>
             <a:p>
               <a:pPr algn="ctr"/>
-              <a:endParaRPr lang="en-US" dirty="0" smtClean="0">
+              <a:endParaRPr lang="en-US" dirty="0">
                 <a:solidFill>
                   <a:srgbClr val="0075ED"/>
                 </a:solidFill>
@@ -11733,7 +11279,7 @@
           <a:lstStyle/>
           <a:p>
             <a:r>
-              <a:rPr lang="en-US" sz="1600" dirty="0" smtClean="0">
+              <a:rPr lang="en-US" sz="1600" dirty="0">
                 <a:solidFill>
                   <a:prstClr val="white">
                     <a:lumMod val="50000"/>
@@ -11744,6 +11290,8 @@
               </a:rPr>
               <a:t>Assignment overview</a:t>
             </a:r>
+          </a:p>
+          <a:p>
             <a:endParaRPr lang="en-US" sz="1600" dirty="0">
               <a:solidFill>
                 <a:prstClr val="white">
@@ -11765,26 +11313,13 @@
               <a:cs typeface="Univers Next Arabic" panose="020B0503030202020203" pitchFamily="34" charset="-78"/>
             </a:endParaRPr>
           </a:p>
-          <a:p>
-            <a:endParaRPr lang="en-US" sz="1600" dirty="0">
-              <a:solidFill>
-                <a:prstClr val="white">
-                  <a:lumMod val="50000"/>
-                </a:prstClr>
-              </a:solidFill>
-              <a:latin typeface="Univers Next Arabic" panose="020B0503030202020203" pitchFamily="34" charset="-78"/>
-              <a:cs typeface="Univers Next Arabic" panose="020B0503030202020203" pitchFamily="34" charset="-78"/>
-            </a:endParaRPr>
-          </a:p>
         </p:txBody>
       </p:sp>
       <p:graphicFrame>
         <p:nvGraphicFramePr>
           <p:cNvPr id="24" name="Chart 23"/>
           <p:cNvGraphicFramePr/>
-          <p:nvPr>
-            <p:extLst/>
-          </p:nvPr>
+          <p:nvPr/>
         </p:nvGraphicFramePr>
         <p:xfrm>
           <a:off x="1867782" y="3606272"/>
@@ -11800,9 +11335,7 @@
         <p:nvGraphicFramePr>
           <p:cNvPr id="28" name="Chart 27"/>
           <p:cNvGraphicFramePr/>
-          <p:nvPr>
-            <p:extLst/>
-          </p:nvPr>
+          <p:nvPr/>
         </p:nvGraphicFramePr>
         <p:xfrm>
           <a:off x="6706604" y="3606272"/>
@@ -11818,9 +11351,7 @@
         <p:nvGraphicFramePr>
           <p:cNvPr id="29" name="Chart 28"/>
           <p:cNvGraphicFramePr/>
-          <p:nvPr>
-            <p:extLst/>
-          </p:nvPr>
+          <p:nvPr/>
         </p:nvGraphicFramePr>
         <p:xfrm>
           <a:off x="1851962" y="3544060"/>
@@ -11836,9 +11367,7 @@
         <p:nvGraphicFramePr>
           <p:cNvPr id="30" name="Chart 29"/>
           <p:cNvGraphicFramePr/>
-          <p:nvPr>
-            <p:extLst/>
-          </p:nvPr>
+          <p:nvPr/>
         </p:nvGraphicFramePr>
         <p:xfrm>
           <a:off x="1288758" y="3596540"/>
@@ -11893,10 +11422,9 @@
           <a:lstStyle/>
           <a:p>
             <a:r>
-              <a:rPr lang="en-US" dirty="0" smtClean="0"/>
+              <a:rPr lang="en-US" dirty="0"/>
               <a:t>Evaluation</a:t>
             </a:r>
-            <a:endParaRPr lang="en-US" dirty="0"/>
           </a:p>
         </p:txBody>
       </p:sp>
@@ -11910,13 +11438,6 @@
   <p:clrMapOvr>
     <a:masterClrMapping/>
   </p:clrMapOvr>
-  <p:timing>
-    <p:tnLst>
-      <p:par>
-        <p:cTn id="1" dur="indefinite" restart="never" nodeType="tmRoot"/>
-      </p:par>
-    </p:tnLst>
-  </p:timing>
 </p:sld>
 </file>
 

</xml_diff>